<commit_message>
change superlink in PPT
</commit_message>
<xml_diff>
--- a/Labs/week1.pptx
+++ b/Labs/week1.pptx
@@ -2978,7 +2978,7 @@
             </a:r>
             <a:r>
               <a:rPr lang="en-US" altLang="zh-CN" dirty="0" smtClean="0">
-                <a:hlinkClick r:id="rId1"/>
+                <a:hlinkClick r:id="rId1" tooltip="" action="ppaction://hlinkfile"/>
               </a:rPr>
               <a:t>Visual Studio Community 2017</a:t>
             </a:r>
@@ -3088,7 +3088,7 @@
         </p:nvSpPr>
         <p:spPr>
           <a:xfrm>
-            <a:off x="838200" y="1353185"/>
+            <a:off x="838200" y="1871345"/>
             <a:ext cx="10515600" cy="4351338"/>
           </a:xfrm>
         </p:spPr>
@@ -3099,10 +3099,6 @@
             <a:r>
               <a:rPr lang="zh-CN" altLang="en-US" dirty="0"/>
               <a:t>安装：</a:t>
-            </a:r>
-            <a:r>
-              <a:rPr lang="zh-CN" altLang="en-US" sz="1900" u="sng" dirty="0"/>
-              <a:t>https://docs.microsoft.com/zh-cn/windows/uwp/get-started/get-set-up</a:t>
             </a:r>
             <a:endParaRPr lang="zh-CN" altLang="en-US" sz="1900" u="sng" dirty="0"/>
           </a:p>
@@ -3130,7 +3126,7 @@
         </p:blipFill>
         <p:spPr>
           <a:xfrm>
-            <a:off x="1704340" y="2069465"/>
+            <a:off x="2344420" y="1932305"/>
             <a:ext cx="7950835" cy="4440555"/>
           </a:xfrm>
           <a:prstGeom prst="rect">
@@ -3158,7 +3154,7 @@
         </p:blipFill>
         <p:spPr>
           <a:xfrm>
-            <a:off x="1704023" y="2069465"/>
+            <a:off x="2344103" y="1932305"/>
             <a:ext cx="4190365" cy="3895090"/>
           </a:xfrm>
           <a:prstGeom prst="rect">
@@ -3186,7 +3182,7 @@
         </p:blipFill>
         <p:spPr>
           <a:xfrm>
-            <a:off x="6674485" y="3084513"/>
+            <a:off x="7314565" y="2947353"/>
             <a:ext cx="2980690" cy="2409825"/>
           </a:xfrm>
           <a:prstGeom prst="rect">
@@ -4705,13 +4701,7 @@
               <a:rPr lang="en-US" altLang="zh-CN" dirty="0" smtClean="0">
                 <a:sym typeface="+mn-ea"/>
               </a:rPr>
-              <a:t>(week 3)  </a:t>
-            </a:r>
-            <a:r>
-              <a:rPr lang="en-US" altLang="zh-CN" dirty="0" smtClean="0">
-                <a:sym typeface="+mn-ea"/>
-              </a:rPr>
-              <a:t>Data Binding</a:t>
+              <a:t>(week 3)  Data Binding</a:t>
             </a:r>
             <a:endParaRPr lang="en-US" altLang="zh-CN" dirty="0" smtClean="0">
               <a:sym typeface="+mn-ea"/>

</xml_diff>